<commit_message>
Updates to the presentation
</commit_message>
<xml_diff>
--- a/docs/Presentation.pptx
+++ b/docs/Presentation.pptx
@@ -9885,6 +9885,37 @@
               </a:rPr>
               <a:t>CQRS Patterns apply to simple code structures as well as service / hardware / architecture design</a:t>
             </a:r>
+          </a:p>
+          <a:p>
+            <a:pPr marL="285750" indent="-285750">
+              <a:buFont typeface="Arial" panose="020B0604020202020204" pitchFamily="34" charset="0"/>
+              <a:buChar char="•"/>
+            </a:pPr>
+            <a:endParaRPr lang="en-US" dirty="0">
+              <a:solidFill>
+                <a:schemeClr val="accent6"/>
+              </a:solidFill>
+            </a:endParaRPr>
+          </a:p>
+          <a:p>
+            <a:pPr marL="285750" indent="-285750">
+              <a:buFont typeface="Arial" panose="020B0604020202020204" pitchFamily="34" charset="0"/>
+              <a:buChar char="•"/>
+            </a:pPr>
+            <a:r>
+              <a:rPr lang="en-US" dirty="0" smtClean="0">
+                <a:solidFill>
+                  <a:schemeClr val="accent6"/>
+                </a:solidFill>
+              </a:rPr>
+              <a:t>Widespread virtualization, orchestration availability in the cloud allows for more flexible, elastic designs</a:t>
+            </a:r>
+          </a:p>
+          <a:p>
+            <a:pPr marL="285750" indent="-285750">
+              <a:buFont typeface="Arial" panose="020B0604020202020204" pitchFamily="34" charset="0"/>
+              <a:buChar char="•"/>
+            </a:pPr>
             <a:endParaRPr lang="en-US" dirty="0" smtClean="0">
               <a:solidFill>
                 <a:schemeClr val="accent6"/>
@@ -9896,6 +9927,14 @@
               <a:buFont typeface="Arial" panose="020B0604020202020204" pitchFamily="34" charset="0"/>
               <a:buChar char="•"/>
             </a:pPr>
+            <a:r>
+              <a:rPr lang="en-US" dirty="0" smtClean="0">
+                <a:solidFill>
+                  <a:schemeClr val="accent6"/>
+                </a:solidFill>
+              </a:rPr>
+              <a:t>Primary goal of separating read / writes allow for vastly different architectures</a:t>
+            </a:r>
             <a:endParaRPr lang="en-US" dirty="0">
               <a:solidFill>
                 <a:schemeClr val="accent6"/>
@@ -9907,152 +9946,98 @@
               <a:buFont typeface="Arial" panose="020B0604020202020204" pitchFamily="34" charset="0"/>
               <a:buChar char="•"/>
             </a:pPr>
+            <a:endParaRPr lang="en-US" dirty="0" smtClean="0">
+              <a:solidFill>
+                <a:schemeClr val="accent6"/>
+              </a:solidFill>
+            </a:endParaRPr>
+          </a:p>
+          <a:p>
+            <a:pPr marL="285750" indent="-285750">
+              <a:buFont typeface="Arial" panose="020B0604020202020204" pitchFamily="34" charset="0"/>
+              <a:buChar char="•"/>
+            </a:pPr>
+            <a:endParaRPr lang="en-US" dirty="0">
+              <a:solidFill>
+                <a:schemeClr val="accent6"/>
+              </a:solidFill>
+            </a:endParaRPr>
+          </a:p>
+          <a:p>
+            <a:pPr marL="285750" indent="-285750">
+              <a:buFont typeface="Arial" panose="020B0604020202020204" pitchFamily="34" charset="0"/>
+              <a:buChar char="•"/>
+            </a:pPr>
+            <a:endParaRPr lang="en-US" dirty="0" smtClean="0">
+              <a:solidFill>
+                <a:schemeClr val="accent6"/>
+              </a:solidFill>
+            </a:endParaRPr>
+          </a:p>
+          <a:p>
+            <a:pPr marL="285750" indent="-285750">
+              <a:buFont typeface="Arial" panose="020B0604020202020204" pitchFamily="34" charset="0"/>
+              <a:buChar char="•"/>
+            </a:pPr>
+            <a:endParaRPr lang="en-US" dirty="0">
+              <a:solidFill>
+                <a:schemeClr val="accent6"/>
+              </a:solidFill>
+            </a:endParaRPr>
+          </a:p>
+          <a:p>
+            <a:pPr marL="285750" indent="-285750">
+              <a:buFont typeface="Arial" panose="020B0604020202020204" pitchFamily="34" charset="0"/>
+              <a:buChar char="•"/>
+            </a:pPr>
+            <a:endParaRPr lang="en-US" dirty="0" smtClean="0">
+              <a:solidFill>
+                <a:schemeClr val="accent6"/>
+              </a:solidFill>
+            </a:endParaRPr>
+          </a:p>
+          <a:p>
+            <a:pPr marL="285750" indent="-285750">
+              <a:buFont typeface="Arial" panose="020B0604020202020204" pitchFamily="34" charset="0"/>
+              <a:buChar char="•"/>
+            </a:pPr>
+            <a:endParaRPr lang="en-US" dirty="0">
+              <a:solidFill>
+                <a:schemeClr val="accent6"/>
+              </a:solidFill>
+            </a:endParaRPr>
+          </a:p>
+          <a:p>
+            <a:pPr marL="285750" indent="-285750">
+              <a:buFont typeface="Arial" panose="020B0604020202020204" pitchFamily="34" charset="0"/>
+              <a:buChar char="•"/>
+            </a:pPr>
+            <a:r>
+              <a:rPr lang="en-US" sz="1200" dirty="0">
+                <a:solidFill>
+                  <a:schemeClr val="accent6"/>
+                </a:solidFill>
+                <a:hlinkClick r:id="rId3"/>
+              </a:rPr>
+              <a:t>https://</a:t>
+            </a:r>
+            <a:r>
+              <a:rPr lang="en-US" sz="1200" dirty="0" smtClean="0">
+                <a:solidFill>
+                  <a:schemeClr val="accent6"/>
+                </a:solidFill>
+                <a:hlinkClick r:id="rId3"/>
+              </a:rPr>
+              <a:t>docs.microsoft.com/en-us/azure/architecture/guide/architecture-styles/cqrs</a:t>
+            </a:r>
             <a:r>
               <a:rPr lang="en-US" dirty="0" smtClean="0">
                 <a:solidFill>
                   <a:schemeClr val="accent6"/>
                 </a:solidFill>
               </a:rPr>
-              <a:t>Widespread virtualization, orchestration availability in the cloud allows for more flexible, elastic designs</a:t>
-            </a:r>
-            <a:endParaRPr lang="en-US" dirty="0" smtClean="0">
-              <a:solidFill>
-                <a:schemeClr val="accent6"/>
-              </a:solidFill>
-            </a:endParaRPr>
-          </a:p>
-          <a:p>
-            <a:pPr marL="285750" indent="-285750">
-              <a:buFont typeface="Arial" panose="020B0604020202020204" pitchFamily="34" charset="0"/>
-              <a:buChar char="•"/>
-            </a:pPr>
-            <a:endParaRPr lang="en-US" dirty="0" smtClean="0">
-              <a:solidFill>
-                <a:schemeClr val="accent6"/>
-              </a:solidFill>
-            </a:endParaRPr>
-          </a:p>
-          <a:p>
-            <a:pPr marL="285750" indent="-285750">
-              <a:buFont typeface="Arial" panose="020B0604020202020204" pitchFamily="34" charset="0"/>
-              <a:buChar char="•"/>
-            </a:pPr>
-            <a:r>
-              <a:rPr lang="en-US" dirty="0" smtClean="0">
-                <a:solidFill>
-                  <a:schemeClr val="accent6"/>
-                </a:solidFill>
-              </a:rPr>
-              <a:t>Primary goal of separating read / writes allow for vastly different architectures</a:t>
-            </a:r>
-            <a:endParaRPr lang="en-US" dirty="0">
-              <a:solidFill>
-                <a:schemeClr val="accent6"/>
-              </a:solidFill>
-            </a:endParaRPr>
-          </a:p>
-          <a:p>
-            <a:pPr marL="285750" indent="-285750">
-              <a:buFont typeface="Arial" panose="020B0604020202020204" pitchFamily="34" charset="0"/>
-              <a:buChar char="•"/>
-            </a:pPr>
-            <a:endParaRPr lang="en-US" dirty="0" smtClean="0">
-              <a:solidFill>
-                <a:schemeClr val="accent6"/>
-              </a:solidFill>
-            </a:endParaRPr>
-          </a:p>
-          <a:p>
-            <a:pPr marL="285750" indent="-285750">
-              <a:buFont typeface="Arial" panose="020B0604020202020204" pitchFamily="34" charset="0"/>
-              <a:buChar char="•"/>
-            </a:pPr>
-            <a:endParaRPr lang="en-US" dirty="0">
-              <a:solidFill>
-                <a:schemeClr val="accent6"/>
-              </a:solidFill>
-            </a:endParaRPr>
-          </a:p>
-          <a:p>
-            <a:pPr marL="285750" indent="-285750">
-              <a:buFont typeface="Arial" panose="020B0604020202020204" pitchFamily="34" charset="0"/>
-              <a:buChar char="•"/>
-            </a:pPr>
-            <a:endParaRPr lang="en-US" dirty="0" smtClean="0">
-              <a:solidFill>
-                <a:schemeClr val="accent6"/>
-              </a:solidFill>
-            </a:endParaRPr>
-          </a:p>
-          <a:p>
-            <a:pPr marL="285750" indent="-285750">
-              <a:buFont typeface="Arial" panose="020B0604020202020204" pitchFamily="34" charset="0"/>
-              <a:buChar char="•"/>
-            </a:pPr>
-            <a:endParaRPr lang="en-US" dirty="0">
-              <a:solidFill>
-                <a:schemeClr val="accent6"/>
-              </a:solidFill>
-            </a:endParaRPr>
-          </a:p>
-          <a:p>
-            <a:pPr marL="285750" indent="-285750">
-              <a:buFont typeface="Arial" panose="020B0604020202020204" pitchFamily="34" charset="0"/>
-              <a:buChar char="•"/>
-            </a:pPr>
-            <a:endParaRPr lang="en-US" dirty="0" smtClean="0">
-              <a:solidFill>
-                <a:schemeClr val="accent6"/>
-              </a:solidFill>
-            </a:endParaRPr>
-          </a:p>
-          <a:p>
-            <a:pPr marL="285750" indent="-285750">
-              <a:buFont typeface="Arial" panose="020B0604020202020204" pitchFamily="34" charset="0"/>
-              <a:buChar char="•"/>
-            </a:pPr>
-            <a:endParaRPr lang="en-US" dirty="0">
-              <a:solidFill>
-                <a:schemeClr val="accent6"/>
-              </a:solidFill>
-            </a:endParaRPr>
-          </a:p>
-          <a:p>
-            <a:pPr marL="285750" indent="-285750">
-              <a:buFont typeface="Arial" panose="020B0604020202020204" pitchFamily="34" charset="0"/>
-              <a:buChar char="•"/>
-            </a:pPr>
-            <a:r>
-              <a:rPr lang="en-US" sz="1200" dirty="0">
-                <a:solidFill>
-                  <a:schemeClr val="accent6"/>
-                </a:solidFill>
-                <a:hlinkClick r:id="rId3"/>
-              </a:rPr>
-              <a:t>https://</a:t>
-            </a:r>
-            <a:r>
-              <a:rPr lang="en-US" sz="1200" dirty="0" smtClean="0">
-                <a:solidFill>
-                  <a:schemeClr val="accent6"/>
-                </a:solidFill>
-                <a:hlinkClick r:id="rId3"/>
-              </a:rPr>
-              <a:t>docs.microsoft.com/en-us/azure/architecture/guide/architecture-styles/cqrs</a:t>
-            </a:r>
-            <a:r>
-              <a:rPr lang="en-US" dirty="0" smtClean="0">
-                <a:solidFill>
-                  <a:schemeClr val="accent6"/>
-                </a:solidFill>
-              </a:rPr>
               <a:t> </a:t>
             </a:r>
-            <a:endParaRPr lang="en-US" dirty="0" smtClean="0">
-              <a:solidFill>
-                <a:schemeClr val="accent6"/>
-              </a:solidFill>
-            </a:endParaRPr>
           </a:p>
           <a:p>
             <a:pPr marL="285750" indent="-285750">
@@ -10265,6 +10250,133 @@
               </a:rPr>
               <a:t>Examples</a:t>
             </a:r>
+          </a:p>
+          <a:p>
+            <a:pPr marL="1184658" lvl="2" indent="-285750">
+              <a:buFont typeface="Arial" panose="020B0604020202020204" pitchFamily="34" charset="0"/>
+              <a:buChar char="•"/>
+            </a:pPr>
+            <a:r>
+              <a:rPr lang="en-US" dirty="0" smtClean="0">
+                <a:solidFill>
+                  <a:schemeClr val="accent6"/>
+                </a:solidFill>
+              </a:rPr>
+              <a:t>SQL Server Availability Groups</a:t>
+            </a:r>
+          </a:p>
+          <a:p>
+            <a:pPr marL="1184658" lvl="2" indent="-285750">
+              <a:buFont typeface="Arial" panose="020B0604020202020204" pitchFamily="34" charset="0"/>
+              <a:buChar char="•"/>
+            </a:pPr>
+            <a:r>
+              <a:rPr lang="en-US" dirty="0" err="1" smtClean="0">
+                <a:solidFill>
+                  <a:schemeClr val="accent6"/>
+                </a:solidFill>
+              </a:rPr>
+              <a:t>redis</a:t>
+            </a:r>
+            <a:r>
+              <a:rPr lang="en-US" dirty="0" smtClean="0">
+                <a:solidFill>
+                  <a:schemeClr val="accent6"/>
+                </a:solidFill>
+              </a:rPr>
+              <a:t> cache as a data store</a:t>
+            </a:r>
+          </a:p>
+          <a:p>
+            <a:pPr marL="1184658" lvl="2" indent="-285750">
+              <a:buFont typeface="Arial" panose="020B0604020202020204" pitchFamily="34" charset="0"/>
+              <a:buChar char="•"/>
+            </a:pPr>
+            <a:r>
+              <a:rPr lang="en-US" dirty="0" err="1" smtClean="0">
+                <a:solidFill>
+                  <a:schemeClr val="accent6"/>
+                </a:solidFill>
+              </a:rPr>
+              <a:t>NoSql</a:t>
+            </a:r>
+            <a:r>
+              <a:rPr lang="en-US" dirty="0" smtClean="0">
+                <a:solidFill>
+                  <a:schemeClr val="accent6"/>
+                </a:solidFill>
+              </a:rPr>
+              <a:t> solutions</a:t>
+            </a:r>
+          </a:p>
+          <a:p>
+            <a:pPr marL="285750" indent="-285750">
+              <a:buFont typeface="Arial" panose="020B0604020202020204" pitchFamily="34" charset="0"/>
+              <a:buChar char="•"/>
+            </a:pPr>
+            <a:endParaRPr lang="en-US" dirty="0">
+              <a:solidFill>
+                <a:schemeClr val="accent6"/>
+              </a:solidFill>
+            </a:endParaRPr>
+          </a:p>
+          <a:p>
+            <a:pPr marL="285750" indent="-285750">
+              <a:buFont typeface="Arial" panose="020B0604020202020204" pitchFamily="34" charset="0"/>
+              <a:buChar char="•"/>
+            </a:pPr>
+            <a:r>
+              <a:rPr lang="en-US" dirty="0" smtClean="0">
+                <a:solidFill>
+                  <a:schemeClr val="accent6"/>
+                </a:solidFill>
+              </a:rPr>
+              <a:t>Writes (Commands)</a:t>
+            </a:r>
+          </a:p>
+          <a:p>
+            <a:pPr marL="735204" lvl="1" indent="-285750">
+              <a:buFont typeface="Arial" panose="020B0604020202020204" pitchFamily="34" charset="0"/>
+              <a:buChar char="•"/>
+            </a:pPr>
+            <a:r>
+              <a:rPr lang="en-US" dirty="0">
+                <a:solidFill>
+                  <a:schemeClr val="accent6"/>
+                </a:solidFill>
+              </a:rPr>
+              <a:t>Reads are migrated away </a:t>
+            </a:r>
+            <a:r>
+              <a:rPr lang="en-US" dirty="0" smtClean="0">
+                <a:solidFill>
+                  <a:schemeClr val="accent6"/>
+                </a:solidFill>
+              </a:rPr>
+              <a:t>to allow </a:t>
+            </a:r>
+            <a:r>
+              <a:rPr lang="en-US" dirty="0">
+                <a:solidFill>
+                  <a:schemeClr val="accent6"/>
+                </a:solidFill>
+              </a:rPr>
+              <a:t>for more “append only” </a:t>
+            </a:r>
+            <a:r>
+              <a:rPr lang="en-US" dirty="0" smtClean="0">
+                <a:solidFill>
+                  <a:schemeClr val="accent6"/>
+                </a:solidFill>
+              </a:rPr>
+              <a:t>persistent write data stores</a:t>
+            </a:r>
+          </a:p>
+          <a:p>
+            <a:pPr marL="285750" indent="-285750">
+              <a:buFont typeface="Arial" panose="020B0604020202020204" pitchFamily="34" charset="0"/>
+              <a:buChar char="•"/>
+            </a:pPr>
             <a:endParaRPr lang="en-US" dirty="0" smtClean="0">
               <a:solidFill>
                 <a:schemeClr val="accent6"/>
@@ -10272,184 +10384,47 @@
             </a:endParaRPr>
           </a:p>
           <a:p>
-            <a:pPr marL="1184658" lvl="2" indent="-285750">
-              <a:buFont typeface="Arial" panose="020B0604020202020204" pitchFamily="34" charset="0"/>
-              <a:buChar char="•"/>
-            </a:pPr>
+            <a:pPr marL="285750" indent="-285750">
+              <a:buFont typeface="Arial" panose="020B0604020202020204" pitchFamily="34" charset="0"/>
+              <a:buChar char="•"/>
+            </a:pPr>
+            <a:endParaRPr lang="en-US" dirty="0">
+              <a:solidFill>
+                <a:schemeClr val="accent6"/>
+              </a:solidFill>
+            </a:endParaRPr>
+          </a:p>
+          <a:p>
+            <a:pPr marL="285750" indent="-285750">
+              <a:buFont typeface="Arial" panose="020B0604020202020204" pitchFamily="34" charset="0"/>
+              <a:buChar char="•"/>
+            </a:pPr>
+            <a:r>
+              <a:rPr lang="en-US" sz="1200" dirty="0">
+                <a:solidFill>
+                  <a:schemeClr val="accent6"/>
+                </a:solidFill>
+                <a:hlinkClick r:id="rId3"/>
+              </a:rPr>
+              <a:t>https://</a:t>
+            </a:r>
+            <a:r>
+              <a:rPr lang="en-US" sz="1200" dirty="0" smtClean="0">
+                <a:solidFill>
+                  <a:schemeClr val="accent6"/>
+                </a:solidFill>
+                <a:hlinkClick r:id="rId3"/>
+              </a:rPr>
+              <a:t>docs.microsoft.com/en-us/azure/architecture/guide/architecture-styles/cqrs</a:t>
+            </a:r>
             <a:r>
               <a:rPr lang="en-US" dirty="0" smtClean="0">
                 <a:solidFill>
                   <a:schemeClr val="accent6"/>
                 </a:solidFill>
               </a:rPr>
-              <a:t>SQL Server Availability Groups</a:t>
-            </a:r>
-          </a:p>
-          <a:p>
-            <a:pPr marL="1184658" lvl="2" indent="-285750">
-              <a:buFont typeface="Arial" panose="020B0604020202020204" pitchFamily="34" charset="0"/>
-              <a:buChar char="•"/>
-            </a:pPr>
-            <a:r>
-              <a:rPr lang="en-US" dirty="0" err="1" smtClean="0">
-                <a:solidFill>
-                  <a:schemeClr val="accent6"/>
-                </a:solidFill>
-              </a:rPr>
-              <a:t>redis</a:t>
-            </a:r>
-            <a:r>
-              <a:rPr lang="en-US" dirty="0" smtClean="0">
-                <a:solidFill>
-                  <a:schemeClr val="accent6"/>
-                </a:solidFill>
-              </a:rPr>
-              <a:t> cache as a data store</a:t>
-            </a:r>
-          </a:p>
-          <a:p>
-            <a:pPr marL="1184658" lvl="2" indent="-285750">
-              <a:buFont typeface="Arial" panose="020B0604020202020204" pitchFamily="34" charset="0"/>
-              <a:buChar char="•"/>
-            </a:pPr>
-            <a:r>
-              <a:rPr lang="en-US" dirty="0" err="1" smtClean="0">
-                <a:solidFill>
-                  <a:schemeClr val="accent6"/>
-                </a:solidFill>
-              </a:rPr>
-              <a:t>NoSql</a:t>
-            </a:r>
-            <a:r>
-              <a:rPr lang="en-US" dirty="0" smtClean="0">
-                <a:solidFill>
-                  <a:schemeClr val="accent6"/>
-                </a:solidFill>
-              </a:rPr>
-              <a:t> solutions</a:t>
-            </a:r>
-          </a:p>
-          <a:p>
-            <a:pPr marL="285750" indent="-285750">
-              <a:buFont typeface="Arial" panose="020B0604020202020204" pitchFamily="34" charset="0"/>
-              <a:buChar char="•"/>
-            </a:pPr>
-            <a:endParaRPr lang="en-US" dirty="0">
-              <a:solidFill>
-                <a:schemeClr val="accent6"/>
-              </a:solidFill>
-            </a:endParaRPr>
-          </a:p>
-          <a:p>
-            <a:pPr marL="285750" indent="-285750">
-              <a:buFont typeface="Arial" panose="020B0604020202020204" pitchFamily="34" charset="0"/>
-              <a:buChar char="•"/>
-            </a:pPr>
-            <a:r>
-              <a:rPr lang="en-US" dirty="0" smtClean="0">
-                <a:solidFill>
-                  <a:schemeClr val="accent6"/>
-                </a:solidFill>
-              </a:rPr>
-              <a:t>Writes (Commands)</a:t>
-            </a:r>
-          </a:p>
-          <a:p>
-            <a:pPr marL="735204" lvl="1" indent="-285750">
-              <a:buFont typeface="Arial" panose="020B0604020202020204" pitchFamily="34" charset="0"/>
-              <a:buChar char="•"/>
-            </a:pPr>
-            <a:r>
-              <a:rPr lang="en-US" dirty="0">
-                <a:solidFill>
-                  <a:schemeClr val="accent6"/>
-                </a:solidFill>
-              </a:rPr>
-              <a:t>Reads are migrated away </a:t>
-            </a:r>
-            <a:r>
-              <a:rPr lang="en-US" dirty="0" smtClean="0">
-                <a:solidFill>
-                  <a:schemeClr val="accent6"/>
-                </a:solidFill>
-              </a:rPr>
-              <a:t>to allow </a:t>
-            </a:r>
-            <a:r>
-              <a:rPr lang="en-US" dirty="0">
-                <a:solidFill>
-                  <a:schemeClr val="accent6"/>
-                </a:solidFill>
-              </a:rPr>
-              <a:t>for more “append only” </a:t>
-            </a:r>
-            <a:r>
-              <a:rPr lang="en-US" dirty="0" smtClean="0">
-                <a:solidFill>
-                  <a:schemeClr val="accent6"/>
-                </a:solidFill>
-              </a:rPr>
-              <a:t>persistent write data stores</a:t>
-            </a:r>
-          </a:p>
-          <a:p>
-            <a:pPr marL="285750" indent="-285750">
-              <a:buFont typeface="Arial" panose="020B0604020202020204" pitchFamily="34" charset="0"/>
-              <a:buChar char="•"/>
-            </a:pPr>
-            <a:endParaRPr lang="en-US" dirty="0" smtClean="0">
-              <a:solidFill>
-                <a:schemeClr val="accent6"/>
-              </a:solidFill>
-            </a:endParaRPr>
-          </a:p>
-          <a:p>
-            <a:pPr marL="285750" indent="-285750">
-              <a:buFont typeface="Arial" panose="020B0604020202020204" pitchFamily="34" charset="0"/>
-              <a:buChar char="•"/>
-            </a:pPr>
-            <a:endParaRPr lang="en-US" dirty="0">
-              <a:solidFill>
-                <a:schemeClr val="accent6"/>
-              </a:solidFill>
-            </a:endParaRPr>
-          </a:p>
-          <a:p>
-            <a:pPr marL="285750" indent="-285750">
-              <a:buFont typeface="Arial" panose="020B0604020202020204" pitchFamily="34" charset="0"/>
-              <a:buChar char="•"/>
-            </a:pPr>
-            <a:r>
-              <a:rPr lang="en-US" sz="1200" dirty="0">
-                <a:solidFill>
-                  <a:schemeClr val="accent6"/>
-                </a:solidFill>
-                <a:hlinkClick r:id="rId3"/>
-              </a:rPr>
-              <a:t>https://</a:t>
-            </a:r>
-            <a:r>
-              <a:rPr lang="en-US" sz="1200" dirty="0" smtClean="0">
-                <a:solidFill>
-                  <a:schemeClr val="accent6"/>
-                </a:solidFill>
-                <a:hlinkClick r:id="rId3"/>
-              </a:rPr>
-              <a:t>docs.microsoft.com/en-us/azure/architecture/guide/architecture-styles/cqrs</a:t>
-            </a:r>
-            <a:r>
-              <a:rPr lang="en-US" dirty="0" smtClean="0">
-                <a:solidFill>
-                  <a:schemeClr val="accent6"/>
-                </a:solidFill>
-              </a:rPr>
               <a:t> </a:t>
             </a:r>
-            <a:endParaRPr lang="en-US" dirty="0" smtClean="0">
-              <a:solidFill>
-                <a:schemeClr val="accent6"/>
-              </a:solidFill>
-            </a:endParaRPr>
           </a:p>
           <a:p>
             <a:pPr marL="285750" indent="-285750">
@@ -11027,7 +11002,6 @@
               <a:rPr lang="en-US" dirty="0" smtClean="0"/>
               <a:t>CQRS Architectures</a:t>
             </a:r>
-            <a:endParaRPr lang="en-US" dirty="0" smtClean="0"/>
           </a:p>
           <a:p>
             <a:r>
@@ -11038,32 +11012,20 @@
           <a:p>
             <a:r>
               <a:rPr lang="en-US" dirty="0" smtClean="0"/>
-              <a:t>Multiple </a:t>
-            </a:r>
+              <a:t>Multiple Data Sources</a:t>
+            </a:r>
+          </a:p>
+          <a:p>
             <a:r>
               <a:rPr lang="en-US" dirty="0" smtClean="0"/>
-              <a:t>Data Sources</a:t>
-            </a:r>
-          </a:p>
-          <a:p>
-            <a:r>
-              <a:rPr lang="en-US" dirty="0" smtClean="0"/>
-              <a:t>Comparisons to Event </a:t>
-            </a:r>
-            <a:r>
-              <a:rPr lang="en-US" dirty="0" smtClean="0"/>
-              <a:t>Sourcing</a:t>
+              <a:t>Comparisons to Event Sourcing</a:t>
             </a:r>
             <a:endParaRPr lang="en-US" baseline="0" dirty="0" smtClean="0"/>
           </a:p>
           <a:p>
             <a:r>
               <a:rPr lang="en-US" baseline="0" dirty="0" smtClean="0"/>
-              <a:t>Performance </a:t>
-            </a:r>
-            <a:r>
-              <a:rPr lang="en-US" baseline="0" dirty="0" smtClean="0"/>
-              <a:t>and Scalability in Azure</a:t>
+              <a:t>Performance and Scalability in Azure</a:t>
             </a:r>
           </a:p>
           <a:p>
@@ -11071,7 +11033,6 @@
               <a:rPr lang="en-US" baseline="0" dirty="0" smtClean="0"/>
               <a:t>More Code Demos!</a:t>
             </a:r>
-            <a:endParaRPr lang="en-US" baseline="0" dirty="0" smtClean="0"/>
           </a:p>
           <a:p>
             <a:r>
@@ -11848,11 +11809,7 @@
           <a:p>
             <a:r>
               <a:rPr lang="en-US" dirty="0" smtClean="0"/>
-              <a:t>Azure </a:t>
-            </a:r>
-            <a:r>
-              <a:rPr lang="en-US" dirty="0" smtClean="0"/>
-              <a:t>Redundant Storage</a:t>
+              <a:t>Azure Redundant Storage</a:t>
             </a:r>
             <a:endParaRPr lang="en-US" dirty="0"/>
           </a:p>
@@ -12315,15 +12272,7 @@
                   <a:schemeClr val="accent6"/>
                 </a:solidFill>
               </a:rPr>
-              <a:t>Auto Scaling can provision new </a:t>
-            </a:r>
-            <a:r>
-              <a:rPr lang="en-US" dirty="0" smtClean="0">
-                <a:solidFill>
-                  <a:schemeClr val="accent6"/>
-                </a:solidFill>
-              </a:rPr>
-              <a:t>VMs, services, or increase / decrease the capacity of a resource – i.e. horizontal and vertical</a:t>
+              <a:t>Auto Scaling can provision new VMs, services, or increase / decrease the capacity of a resource – i.e. horizontal and vertical</a:t>
             </a:r>
           </a:p>
           <a:p>
@@ -13651,11 +13600,7 @@
           <a:p>
             <a:r>
               <a:rPr lang="en-US" dirty="0" smtClean="0"/>
-              <a:t>Learned </a:t>
-            </a:r>
-            <a:r>
-              <a:rPr lang="en-US" dirty="0" smtClean="0"/>
-              <a:t>so Far…</a:t>
+              <a:t>Learned so Far…</a:t>
             </a:r>
             <a:endParaRPr lang="en-US" dirty="0"/>
           </a:p>
@@ -13700,7 +13645,6 @@
               <a:rPr lang="en-US" dirty="0" smtClean="0"/>
               <a:t>CQRS Architectures</a:t>
             </a:r>
-            <a:endParaRPr lang="en-US" dirty="0" smtClean="0"/>
           </a:p>
           <a:p>
             <a:r>
@@ -13711,32 +13655,20 @@
           <a:p>
             <a:r>
               <a:rPr lang="en-US" dirty="0" smtClean="0"/>
-              <a:t>Multiple </a:t>
-            </a:r>
+              <a:t>Multiple Data Sources</a:t>
+            </a:r>
+          </a:p>
+          <a:p>
             <a:r>
               <a:rPr lang="en-US" dirty="0" smtClean="0"/>
-              <a:t>Data Sources</a:t>
-            </a:r>
-          </a:p>
-          <a:p>
-            <a:r>
-              <a:rPr lang="en-US" dirty="0" smtClean="0"/>
-              <a:t>Comparisons to Event </a:t>
-            </a:r>
-            <a:r>
-              <a:rPr lang="en-US" dirty="0" smtClean="0"/>
-              <a:t>Sourcing</a:t>
+              <a:t>Comparisons to Event Sourcing</a:t>
             </a:r>
             <a:endParaRPr lang="en-US" baseline="0" dirty="0" smtClean="0"/>
           </a:p>
           <a:p>
             <a:r>
               <a:rPr lang="en-US" baseline="0" dirty="0" smtClean="0"/>
-              <a:t>Performance </a:t>
-            </a:r>
-            <a:r>
-              <a:rPr lang="en-US" baseline="0" dirty="0" smtClean="0"/>
-              <a:t>and Scalability in Azure</a:t>
+              <a:t>Performance and Scalability in Azure</a:t>
             </a:r>
           </a:p>
           <a:p>
@@ -16088,7 +16020,7 @@
         <p:spPr>
           <a:xfrm>
             <a:off x="569167" y="1371600"/>
-            <a:ext cx="4079033" cy="4819781"/>
+            <a:ext cx="4079033" cy="5909310"/>
           </a:xfrm>
           <a:prstGeom prst="rect">
             <a:avLst/>
@@ -16189,8 +16121,27 @@
                   <a:schemeClr val="accent6"/>
                 </a:solidFill>
               </a:rPr>
-              <a:t>.</a:t>
-            </a:r>
+              <a:t>Could require event handling acknowledgement</a:t>
+            </a:r>
+          </a:p>
+          <a:p>
+            <a:pPr marL="735204" lvl="1" indent="-285750">
+              <a:buFont typeface="Arial" panose="020B0604020202020204" pitchFamily="34" charset="0"/>
+              <a:buChar char="•"/>
+            </a:pPr>
+            <a:r>
+              <a:rPr lang="en-US" dirty="0" smtClean="0">
+                <a:solidFill>
+                  <a:schemeClr val="accent6"/>
+                </a:solidFill>
+              </a:rPr>
+              <a:t>Commands could be setup to only return success when all subscribers return successfully</a:t>
+            </a:r>
+            <a:endParaRPr lang="en-US" dirty="0" smtClean="0">
+              <a:solidFill>
+                <a:schemeClr val="accent6"/>
+              </a:solidFill>
+            </a:endParaRPr>
           </a:p>
           <a:p>
             <a:pPr marL="285750" indent="-285750">
@@ -16506,6 +16457,437 @@
               </a:rPr>
               <a:t>  </a:t>
             </a:r>
+          </a:p>
+        </p:txBody>
+      </p:sp>
+      <p:sp>
+        <p:nvSpPr>
+          <p:cNvPr id="5" name="TextBox 4"/>
+          <p:cNvSpPr txBox="1"/>
+          <p:nvPr/>
+        </p:nvSpPr>
+        <p:spPr>
+          <a:xfrm>
+            <a:off x="6123551" y="1371600"/>
+            <a:ext cx="5230249" cy="4953664"/>
+          </a:xfrm>
+          <a:prstGeom prst="rect">
+            <a:avLst/>
+          </a:prstGeom>
+          <a:noFill/>
+        </p:spPr>
+        <p:txBody>
+          <a:bodyPr wrap="square" rtlCol="0">
+            <a:spAutoFit/>
+          </a:bodyPr>
+          <a:lstStyle/>
+          <a:p>
+            <a:pPr marL="285750" indent="-285750">
+              <a:buFont typeface="Arial" panose="020B0604020202020204" pitchFamily="34" charset="0"/>
+              <a:buChar char="•"/>
+            </a:pPr>
+            <a:r>
+              <a:rPr lang="en-US" i="1" dirty="0" smtClean="0">
+                <a:solidFill>
+                  <a:schemeClr val="accent6"/>
+                </a:solidFill>
+              </a:rPr>
+              <a:t>CQRS Query:</a:t>
+            </a:r>
+            <a:endParaRPr lang="en-US" i="1" dirty="0" smtClean="0">
+              <a:solidFill>
+                <a:schemeClr val="accent6"/>
+              </a:solidFill>
+            </a:endParaRPr>
+          </a:p>
+          <a:p>
+            <a:pPr lvl="1"/>
+            <a:r>
+              <a:rPr lang="en-US" sz="1600" dirty="0" smtClean="0">
+                <a:solidFill>
+                  <a:schemeClr val="accent6"/>
+                </a:solidFill>
+                <a:latin typeface="Consolas" panose="020B0609020204030204" pitchFamily="49" charset="0"/>
+                <a:cs typeface="Courier New" panose="02070309020205020404" pitchFamily="49" charset="0"/>
+              </a:rPr>
+              <a:t>{</a:t>
+            </a:r>
+          </a:p>
+          <a:p>
+            <a:pPr lvl="2"/>
+            <a:r>
+              <a:rPr lang="en-US" sz="1600" dirty="0" smtClean="0">
+                <a:solidFill>
+                  <a:schemeClr val="accent6"/>
+                </a:solidFill>
+                <a:latin typeface="Consolas" panose="020B0609020204030204" pitchFamily="49" charset="0"/>
+                <a:cs typeface="Courier New" panose="02070309020205020404" pitchFamily="49" charset="0"/>
+              </a:rPr>
+              <a:t>“name”: “</a:t>
+            </a:r>
+            <a:r>
+              <a:rPr lang="en-US" sz="1600" dirty="0" err="1" smtClean="0">
+                <a:solidFill>
+                  <a:schemeClr val="accent6"/>
+                </a:solidFill>
+                <a:latin typeface="Consolas" panose="020B0609020204030204" pitchFamily="49" charset="0"/>
+                <a:cs typeface="Courier New" panose="02070309020205020404" pitchFamily="49" charset="0"/>
+              </a:rPr>
+              <a:t>MyQuery</a:t>
+            </a:r>
+            <a:r>
+              <a:rPr lang="en-US" sz="1600" dirty="0" smtClean="0">
+                <a:solidFill>
+                  <a:schemeClr val="accent6"/>
+                </a:solidFill>
+                <a:latin typeface="Consolas" panose="020B0609020204030204" pitchFamily="49" charset="0"/>
+                <a:cs typeface="Courier New" panose="02070309020205020404" pitchFamily="49" charset="0"/>
+              </a:rPr>
+              <a:t>”,</a:t>
+            </a:r>
+          </a:p>
+          <a:p>
+            <a:pPr lvl="2"/>
+            <a:r>
+              <a:rPr lang="en-US" sz="1600" dirty="0" smtClean="0">
+                <a:solidFill>
+                  <a:schemeClr val="accent6"/>
+                </a:solidFill>
+                <a:latin typeface="Consolas" panose="020B0609020204030204" pitchFamily="49" charset="0"/>
+                <a:cs typeface="Courier New" panose="02070309020205020404" pitchFamily="49" charset="0"/>
+              </a:rPr>
+              <a:t>“props”: {</a:t>
+            </a:r>
+          </a:p>
+          <a:p>
+            <a:pPr lvl="2"/>
+            <a:r>
+              <a:rPr lang="en-US" sz="1600" dirty="0" smtClean="0">
+                <a:solidFill>
+                  <a:schemeClr val="accent6"/>
+                </a:solidFill>
+                <a:latin typeface="Consolas" panose="020B0609020204030204" pitchFamily="49" charset="0"/>
+                <a:cs typeface="Courier New" panose="02070309020205020404" pitchFamily="49" charset="0"/>
+              </a:rPr>
+              <a:t>    “</a:t>
+            </a:r>
+            <a:r>
+              <a:rPr lang="en-US" sz="1600" dirty="0" err="1" smtClean="0">
+                <a:solidFill>
+                  <a:schemeClr val="accent6"/>
+                </a:solidFill>
+                <a:latin typeface="Consolas" panose="020B0609020204030204" pitchFamily="49" charset="0"/>
+                <a:cs typeface="Courier New" panose="02070309020205020404" pitchFamily="49" charset="0"/>
+              </a:rPr>
+              <a:t>firstName</a:t>
+            </a:r>
+            <a:r>
+              <a:rPr lang="en-US" sz="1600" dirty="0" smtClean="0">
+                <a:solidFill>
+                  <a:schemeClr val="accent6"/>
+                </a:solidFill>
+                <a:latin typeface="Consolas" panose="020B0609020204030204" pitchFamily="49" charset="0"/>
+                <a:cs typeface="Courier New" panose="02070309020205020404" pitchFamily="49" charset="0"/>
+              </a:rPr>
+              <a:t>”: “Jon”,</a:t>
+            </a:r>
+          </a:p>
+          <a:p>
+            <a:pPr lvl="2"/>
+            <a:r>
+              <a:rPr lang="en-US" sz="1600" dirty="0">
+                <a:solidFill>
+                  <a:schemeClr val="accent6"/>
+                </a:solidFill>
+                <a:latin typeface="Consolas" panose="020B0609020204030204" pitchFamily="49" charset="0"/>
+                <a:cs typeface="Courier New" panose="02070309020205020404" pitchFamily="49" charset="0"/>
+              </a:rPr>
+              <a:t> </a:t>
+            </a:r>
+            <a:r>
+              <a:rPr lang="en-US" sz="1600" dirty="0" smtClean="0">
+                <a:solidFill>
+                  <a:schemeClr val="accent6"/>
+                </a:solidFill>
+                <a:latin typeface="Consolas" panose="020B0609020204030204" pitchFamily="49" charset="0"/>
+                <a:cs typeface="Courier New" panose="02070309020205020404" pitchFamily="49" charset="0"/>
+              </a:rPr>
+              <a:t>   “</a:t>
+            </a:r>
+            <a:r>
+              <a:rPr lang="en-US" sz="1600" dirty="0" err="1" smtClean="0">
+                <a:solidFill>
+                  <a:schemeClr val="accent6"/>
+                </a:solidFill>
+                <a:latin typeface="Consolas" panose="020B0609020204030204" pitchFamily="49" charset="0"/>
+                <a:cs typeface="Courier New" panose="02070309020205020404" pitchFamily="49" charset="0"/>
+              </a:rPr>
+              <a:t>lastName</a:t>
+            </a:r>
+            <a:r>
+              <a:rPr lang="en-US" sz="1600" dirty="0" smtClean="0">
+                <a:solidFill>
+                  <a:schemeClr val="accent6"/>
+                </a:solidFill>
+                <a:latin typeface="Consolas" panose="020B0609020204030204" pitchFamily="49" charset="0"/>
+                <a:cs typeface="Courier New" panose="02070309020205020404" pitchFamily="49" charset="0"/>
+              </a:rPr>
+              <a:t>”: “Banta”</a:t>
+            </a:r>
+          </a:p>
+          <a:p>
+            <a:pPr lvl="2"/>
+            <a:r>
+              <a:rPr lang="en-US" sz="1600" dirty="0">
+                <a:solidFill>
+                  <a:schemeClr val="accent6"/>
+                </a:solidFill>
+                <a:latin typeface="Consolas" panose="020B0609020204030204" pitchFamily="49" charset="0"/>
+                <a:cs typeface="Courier New" panose="02070309020205020404" pitchFamily="49" charset="0"/>
+              </a:rPr>
+              <a:t>}</a:t>
+            </a:r>
+            <a:endParaRPr lang="en-US" sz="1600" dirty="0" smtClean="0">
+              <a:solidFill>
+                <a:schemeClr val="accent6"/>
+              </a:solidFill>
+              <a:latin typeface="Consolas" panose="020B0609020204030204" pitchFamily="49" charset="0"/>
+              <a:cs typeface="Courier New" panose="02070309020205020404" pitchFamily="49" charset="0"/>
+            </a:endParaRPr>
+          </a:p>
+          <a:p>
+            <a:pPr lvl="1"/>
+            <a:r>
+              <a:rPr lang="en-US" sz="1600" dirty="0" smtClean="0">
+                <a:solidFill>
+                  <a:schemeClr val="accent6"/>
+                </a:solidFill>
+                <a:latin typeface="Consolas" panose="020B0609020204030204" pitchFamily="49" charset="0"/>
+                <a:cs typeface="Courier New" panose="02070309020205020404" pitchFamily="49" charset="0"/>
+              </a:rPr>
+              <a:t>}</a:t>
+            </a:r>
+            <a:r>
+              <a:rPr lang="en-US" dirty="0" smtClean="0">
+                <a:solidFill>
+                  <a:schemeClr val="accent6"/>
+                </a:solidFill>
+              </a:rPr>
+              <a:t/>
+            </a:r>
+            <a:br>
+              <a:rPr lang="en-US" dirty="0" smtClean="0">
+                <a:solidFill>
+                  <a:schemeClr val="accent6"/>
+                </a:solidFill>
+              </a:rPr>
+            </a:br>
+            <a:endParaRPr lang="en-US" dirty="0" smtClean="0">
+              <a:solidFill>
+                <a:schemeClr val="accent6"/>
+              </a:solidFill>
+            </a:endParaRPr>
+          </a:p>
+          <a:p>
+            <a:pPr marL="285750" indent="-285750">
+              <a:buFont typeface="Arial" panose="020B0604020202020204" pitchFamily="34" charset="0"/>
+              <a:buChar char="•"/>
+            </a:pPr>
+            <a:r>
+              <a:rPr lang="en-US" i="1" dirty="0" smtClean="0">
+                <a:solidFill>
+                  <a:schemeClr val="accent6"/>
+                </a:solidFill>
+              </a:rPr>
+              <a:t>Generate Hash:</a:t>
+            </a:r>
+          </a:p>
+          <a:p>
+            <a:pPr marL="285750" indent="-285750">
+              <a:buFont typeface="Arial" panose="020B0604020202020204" pitchFamily="34" charset="0"/>
+              <a:buChar char="•"/>
+            </a:pPr>
+            <a:endParaRPr lang="en-US" i="1" dirty="0" smtClean="0">
+              <a:solidFill>
+                <a:schemeClr val="accent6"/>
+              </a:solidFill>
+            </a:endParaRPr>
+          </a:p>
+          <a:p>
+            <a:pPr lvl="1"/>
+            <a:r>
+              <a:rPr lang="en-US" sz="1600" dirty="0" err="1" smtClean="0">
+                <a:solidFill>
+                  <a:schemeClr val="accent6"/>
+                </a:solidFill>
+                <a:latin typeface="Consolas" panose="020B0609020204030204" pitchFamily="49" charset="0"/>
+              </a:rPr>
+              <a:t>var</a:t>
+            </a:r>
+            <a:r>
+              <a:rPr lang="en-US" sz="1600" dirty="0" smtClean="0">
+                <a:solidFill>
+                  <a:schemeClr val="accent6"/>
+                </a:solidFill>
+                <a:latin typeface="Consolas" panose="020B0609020204030204" pitchFamily="49" charset="0"/>
+              </a:rPr>
+              <a:t> hash = </a:t>
+            </a:r>
+            <a:r>
+              <a:rPr lang="en-US" sz="1600" dirty="0" err="1" smtClean="0">
+                <a:solidFill>
+                  <a:schemeClr val="accent6"/>
+                </a:solidFill>
+                <a:latin typeface="Consolas" panose="020B0609020204030204" pitchFamily="49" charset="0"/>
+              </a:rPr>
+              <a:t>crc.Generate</a:t>
+            </a:r>
+            <a:r>
+              <a:rPr lang="en-US" sz="1600" dirty="0" smtClean="0">
+                <a:solidFill>
+                  <a:schemeClr val="accent6"/>
+                </a:solidFill>
+                <a:latin typeface="Consolas" panose="020B0609020204030204" pitchFamily="49" charset="0"/>
+              </a:rPr>
+              <a:t>(query);</a:t>
+            </a:r>
+          </a:p>
+          <a:p>
+            <a:pPr lvl="1"/>
+            <a:endParaRPr lang="en-US" dirty="0" smtClean="0">
+              <a:solidFill>
+                <a:schemeClr val="accent6"/>
+              </a:solidFill>
+            </a:endParaRPr>
+          </a:p>
+          <a:p>
+            <a:pPr marL="285750" indent="-285750">
+              <a:buFont typeface="Arial" panose="020B0604020202020204" pitchFamily="34" charset="0"/>
+              <a:buChar char="•"/>
+            </a:pPr>
+            <a:r>
+              <a:rPr lang="en-US" i="1" dirty="0" smtClean="0">
+                <a:solidFill>
+                  <a:schemeClr val="accent6"/>
+                </a:solidFill>
+              </a:rPr>
+              <a:t>Lookup Response:</a:t>
+            </a:r>
+            <a:endParaRPr lang="en-US" i="1" dirty="0" smtClean="0">
+              <a:solidFill>
+                <a:schemeClr val="accent6"/>
+              </a:solidFill>
+            </a:endParaRPr>
+          </a:p>
+          <a:p>
+            <a:pPr lvl="1"/>
+            <a:endParaRPr lang="en-US" sz="1600" dirty="0" smtClean="0">
+              <a:solidFill>
+                <a:schemeClr val="accent6"/>
+              </a:solidFill>
+              <a:latin typeface="Consolas" panose="020B0609020204030204" pitchFamily="49" charset="0"/>
+            </a:endParaRPr>
+          </a:p>
+          <a:p>
+            <a:pPr lvl="1"/>
+            <a:r>
+              <a:rPr lang="en-US" sz="1600" dirty="0" err="1" smtClean="0">
+                <a:solidFill>
+                  <a:schemeClr val="accent6"/>
+                </a:solidFill>
+                <a:latin typeface="Consolas" panose="020B0609020204030204" pitchFamily="49" charset="0"/>
+              </a:rPr>
+              <a:t>var</a:t>
+            </a:r>
+            <a:r>
+              <a:rPr lang="en-US" sz="1600" dirty="0" smtClean="0">
+                <a:solidFill>
+                  <a:schemeClr val="accent6"/>
+                </a:solidFill>
+                <a:latin typeface="Consolas" panose="020B0609020204030204" pitchFamily="49" charset="0"/>
+              </a:rPr>
+              <a:t> </a:t>
+            </a:r>
+            <a:r>
+              <a:rPr lang="en-US" sz="1600" dirty="0" err="1" smtClean="0">
+                <a:solidFill>
+                  <a:schemeClr val="accent6"/>
+                </a:solidFill>
+                <a:latin typeface="Consolas" panose="020B0609020204030204" pitchFamily="49" charset="0"/>
+              </a:rPr>
+              <a:t>queryResponse</a:t>
+            </a:r>
+            <a:r>
+              <a:rPr lang="en-US" sz="1600" dirty="0" smtClean="0">
+                <a:solidFill>
+                  <a:schemeClr val="accent6"/>
+                </a:solidFill>
+                <a:latin typeface="Consolas" panose="020B0609020204030204" pitchFamily="49" charset="0"/>
+              </a:rPr>
+              <a:t> =       	</a:t>
+            </a:r>
+            <a:r>
+              <a:rPr lang="en-US" sz="1600" dirty="0" err="1" smtClean="0">
+                <a:solidFill>
+                  <a:schemeClr val="accent6"/>
+                </a:solidFill>
+                <a:latin typeface="Consolas" panose="020B0609020204030204" pitchFamily="49" charset="0"/>
+              </a:rPr>
+              <a:t>redis.lookup</a:t>
+            </a:r>
+            <a:r>
+              <a:rPr lang="en-US" sz="1600" dirty="0" smtClean="0">
+                <a:solidFill>
+                  <a:schemeClr val="accent6"/>
+                </a:solidFill>
+                <a:latin typeface="Consolas" panose="020B0609020204030204" pitchFamily="49" charset="0"/>
+              </a:rPr>
+              <a:t>(“</a:t>
+            </a:r>
+            <a:r>
+              <a:rPr lang="en-US" sz="1600" dirty="0" err="1" smtClean="0">
+                <a:solidFill>
+                  <a:schemeClr val="accent6"/>
+                </a:solidFill>
+                <a:latin typeface="Consolas" panose="020B0609020204030204" pitchFamily="49" charset="0"/>
+              </a:rPr>
+              <a:t>MyQuery</a:t>
+            </a:r>
+            <a:r>
+              <a:rPr lang="en-US" sz="1600" dirty="0" smtClean="0">
+                <a:solidFill>
+                  <a:schemeClr val="accent6"/>
+                </a:solidFill>
+                <a:latin typeface="Consolas" panose="020B0609020204030204" pitchFamily="49" charset="0"/>
+              </a:rPr>
+              <a:t>” + hash);</a:t>
+            </a:r>
+            <a:endParaRPr lang="en-US" sz="1600" dirty="0">
+              <a:solidFill>
+                <a:schemeClr val="accent6"/>
+              </a:solidFill>
+              <a:latin typeface="Consolas" panose="020B0609020204030204" pitchFamily="49" charset="0"/>
+            </a:endParaRPr>
+          </a:p>
+          <a:p>
+            <a:pPr lvl="1"/>
+            <a:endParaRPr lang="en-US" sz="1600" dirty="0">
+              <a:solidFill>
+                <a:schemeClr val="accent6"/>
+              </a:solidFill>
+              <a:latin typeface="Consolas" panose="020B0609020204030204" pitchFamily="49" charset="0"/>
+            </a:endParaRPr>
+          </a:p>
+          <a:p>
+            <a:pPr marL="285750" indent="-285750">
+              <a:buFont typeface="Arial" panose="020B0604020202020204" pitchFamily="34" charset="0"/>
+              <a:buChar char="•"/>
+            </a:pPr>
+            <a:endParaRPr lang="en-US" dirty="0" smtClean="0">
+              <a:solidFill>
+                <a:schemeClr val="accent6"/>
+              </a:solidFill>
+            </a:endParaRPr>
           </a:p>
         </p:txBody>
       </p:sp>

</xml_diff>